<commit_message>
Updates for day 5
</commit_message>
<xml_diff>
--- a/day5/lecture5_extensions.pptx
+++ b/day5/lecture5_extensions.pptx
@@ -224,7 +224,7 @@
           <a:p>
             <a:fld id="{B73D2FB9-C09F-4CC9-B56B-0E79DA024731}" type="datetimeFigureOut">
               <a:rPr lang="en-US" smtClean="0"/>
-              <a:t>1/18/2018</a:t>
+              <a:t>1/19/2018</a:t>
             </a:fld>
             <a:endParaRPr lang="en-US"/>
           </a:p>
@@ -573,7 +573,7 @@
           </a:ln>
           <a:extLst>
             <a:ext uri="{909E8E84-426E-40dd-AFC4-6F175D3DCCD1}">
-              <a14:hiddenFill xmlns:a14="http://schemas.microsoft.com/office/drawing/2010/main" xmlns="">
+              <a14:hiddenFill xmlns="" xmlns:a14="http://schemas.microsoft.com/office/drawing/2010/main">
                 <a:solidFill>
                   <a:srgbClr val="FFFFFF"/>
                 </a:solidFill>
@@ -616,7 +616,7 @@
           </a:ln>
           <a:extLst>
             <a:ext uri="{909E8E84-426E-40dd-AFC4-6F175D3DCCD1}">
-              <a14:hiddenFill xmlns:a14="http://schemas.microsoft.com/office/drawing/2010/main" xmlns="">
+              <a14:hiddenFill xmlns="" xmlns:a14="http://schemas.microsoft.com/office/drawing/2010/main">
                 <a:noFill/>
               </a14:hiddenFill>
             </a:ext>
@@ -715,7 +715,7 @@
           <a:p>
             <a:fld id="{39E044C2-93E3-4A4B-B6A1-D8E9993814C7}" type="datetime1">
               <a:rPr lang="en-US" smtClean="0"/>
-              <a:t>1/18/2018</a:t>
+              <a:t>1/19/2018</a:t>
             </a:fld>
             <a:endParaRPr lang="en-US"/>
           </a:p>
@@ -902,7 +902,7 @@
           <a:p>
             <a:fld id="{C817BF3A-F2D3-46BD-9E1F-1F9DD7E62B68}" type="datetime1">
               <a:rPr lang="en-US" smtClean="0"/>
-              <a:t>1/18/2018</a:t>
+              <a:t>1/19/2018</a:t>
             </a:fld>
             <a:endParaRPr lang="en-US"/>
           </a:p>
@@ -1098,7 +1098,7 @@
           <a:p>
             <a:fld id="{A25B53AB-0559-4EB5-BE4B-3F20476566A1}" type="datetime1">
               <a:rPr lang="en-US" smtClean="0"/>
-              <a:t>1/18/2018</a:t>
+              <a:t>1/19/2018</a:t>
             </a:fld>
             <a:endParaRPr lang="en-US"/>
           </a:p>
@@ -1350,7 +1350,7 @@
           <a:p>
             <a:fld id="{25085B04-7A33-416C-A7FB-D64ADDEB8FCC}" type="datetime1">
               <a:rPr lang="en-US" smtClean="0"/>
-              <a:t>1/18/2018</a:t>
+              <a:t>1/19/2018</a:t>
             </a:fld>
             <a:endParaRPr lang="en-US"/>
           </a:p>
@@ -1575,7 +1575,7 @@
           <a:p>
             <a:fld id="{25085B04-7A33-416C-A7FB-D64ADDEB8FCC}" type="datetime1">
               <a:rPr lang="en-US" smtClean="0"/>
-              <a:t>1/18/2018</a:t>
+              <a:t>1/19/2018</a:t>
             </a:fld>
             <a:endParaRPr lang="en-US"/>
           </a:p>
@@ -1884,7 +1884,7 @@
           <a:p>
             <a:fld id="{25085B04-7A33-416C-A7FB-D64ADDEB8FCC}" type="datetime1">
               <a:rPr lang="en-US" smtClean="0"/>
-              <a:t>1/18/2018</a:t>
+              <a:t>1/19/2018</a:t>
             </a:fld>
             <a:endParaRPr lang="en-US"/>
           </a:p>
@@ -2053,7 +2053,7 @@
           <a:p>
             <a:fld id="{25085B04-7A33-416C-A7FB-D64ADDEB8FCC}" type="datetime1">
               <a:rPr lang="en-US" smtClean="0"/>
-              <a:t>1/18/2018</a:t>
+              <a:t>1/19/2018</a:t>
             </a:fld>
             <a:endParaRPr lang="en-US"/>
           </a:p>
@@ -2366,7 +2366,7 @@
           <a:p>
             <a:fld id="{25085B04-7A33-416C-A7FB-D64ADDEB8FCC}" type="datetime1">
               <a:rPr lang="en-US" smtClean="0"/>
-              <a:t>1/18/2018</a:t>
+              <a:t>1/19/2018</a:t>
             </a:fld>
             <a:endParaRPr lang="en-US"/>
           </a:p>
@@ -2679,7 +2679,7 @@
           <a:p>
             <a:fld id="{25085B04-7A33-416C-A7FB-D64ADDEB8FCC}" type="datetime1">
               <a:rPr lang="en-US" smtClean="0"/>
-              <a:t>1/18/2018</a:t>
+              <a:t>1/19/2018</a:t>
             </a:fld>
             <a:endParaRPr lang="en-US"/>
           </a:p>
@@ -2900,7 +2900,7 @@
           <a:p>
             <a:fld id="{BA23EE8D-9CE0-4F42-A40F-E28604EA7175}" type="datetime1">
               <a:rPr lang="en-US" smtClean="0"/>
-              <a:t>1/18/2018</a:t>
+              <a:t>1/19/2018</a:t>
             </a:fld>
             <a:endParaRPr lang="en-US"/>
           </a:p>
@@ -3098,7 +3098,7 @@
           <a:p>
             <a:fld id="{1A4DAFB5-4EEC-49BD-AB33-559CD6F558E3}" type="datetime1">
               <a:rPr lang="en-US" smtClean="0"/>
-              <a:t>1/18/2018</a:t>
+              <a:t>1/19/2018</a:t>
             </a:fld>
             <a:endParaRPr lang="en-US"/>
           </a:p>
@@ -3284,7 +3284,7 @@
           <a:p>
             <a:fld id="{48D5DDFF-6E4E-48D6-AC14-E6CBA3C0FEB2}" type="datetime1">
               <a:rPr lang="en-US" smtClean="0"/>
-              <a:t>1/18/2018</a:t>
+              <a:t>1/19/2018</a:t>
             </a:fld>
             <a:endParaRPr lang="en-US"/>
           </a:p>
@@ -3559,7 +3559,7 @@
           <a:p>
             <a:fld id="{1EE2056D-DC17-4607-87F9-EA4937BD48E2}" type="datetime1">
               <a:rPr lang="en-US" smtClean="0"/>
-              <a:t>1/18/2018</a:t>
+              <a:t>1/19/2018</a:t>
             </a:fld>
             <a:endParaRPr lang="en-US"/>
           </a:p>
@@ -3824,7 +3824,7 @@
           <a:p>
             <a:fld id="{866E3DAD-9254-43DE-A1F3-F1D56B1E5B5F}" type="datetime1">
               <a:rPr lang="en-US" smtClean="0"/>
-              <a:t>1/18/2018</a:t>
+              <a:t>1/19/2018</a:t>
             </a:fld>
             <a:endParaRPr lang="en-US"/>
           </a:p>
@@ -4236,7 +4236,7 @@
           <a:p>
             <a:fld id="{12F88D45-78A7-46A0-99B7-2046E351D366}" type="datetime1">
               <a:rPr lang="en-US" smtClean="0"/>
-              <a:t>1/18/2018</a:t>
+              <a:t>1/19/2018</a:t>
             </a:fld>
             <a:endParaRPr lang="en-US"/>
           </a:p>
@@ -4377,7 +4377,7 @@
           <a:p>
             <a:fld id="{7716AC84-6778-466F-95F9-3EEE8E306ABF}" type="datetime1">
               <a:rPr lang="en-US" smtClean="0"/>
-              <a:t>1/18/2018</a:t>
+              <a:t>1/19/2018</a:t>
             </a:fld>
             <a:endParaRPr lang="en-US"/>
           </a:p>
@@ -4490,7 +4490,7 @@
           <a:p>
             <a:fld id="{02DEDAFE-CBEF-41E8-868F-E40C867A5636}" type="datetime1">
               <a:rPr lang="en-US" smtClean="0"/>
-              <a:t>1/18/2018</a:t>
+              <a:t>1/19/2018</a:t>
             </a:fld>
             <a:endParaRPr lang="en-US"/>
           </a:p>
@@ -4801,7 +4801,7 @@
           <a:p>
             <a:fld id="{20C87E4D-F358-4436-A283-114607D95274}" type="datetime1">
               <a:rPr lang="en-US" smtClean="0"/>
-              <a:t>1/18/2018</a:t>
+              <a:t>1/19/2018</a:t>
             </a:fld>
             <a:endParaRPr lang="en-US"/>
           </a:p>
@@ -5092,7 +5092,7 @@
           <a:p>
             <a:fld id="{6CCABA82-8A7B-4924-987B-0B7221667B17}" type="datetime1">
               <a:rPr lang="en-US" smtClean="0"/>
-              <a:t>1/18/2018</a:t>
+              <a:t>1/19/2018</a:t>
             </a:fld>
             <a:endParaRPr lang="en-US"/>
           </a:p>
@@ -5290,7 +5290,7 @@
           <a:p>
             <a:fld id="{C602C5EE-1F52-440A-B21D-CF34717184B1}" type="datetime1">
               <a:rPr lang="en-US" smtClean="0"/>
-              <a:t>1/18/2018</a:t>
+              <a:t>1/19/2018</a:t>
             </a:fld>
             <a:endParaRPr lang="en-US"/>
           </a:p>
@@ -5498,7 +5498,7 @@
           <a:p>
             <a:fld id="{88EA7AC3-3927-460F-BC0A-B8263F635273}" type="datetime1">
               <a:rPr lang="en-US" smtClean="0"/>
-              <a:t>1/18/2018</a:t>
+              <a:t>1/19/2018</a:t>
             </a:fld>
             <a:endParaRPr lang="en-US"/>
           </a:p>
@@ -5707,7 +5707,7 @@
           <a:p>
             <a:fld id="{0FFE502A-1A4E-496B-B2D2-529468F64463}" type="datetime1">
               <a:rPr lang="en-US" smtClean="0"/>
-              <a:t>1/18/2018</a:t>
+              <a:t>1/19/2018</a:t>
             </a:fld>
             <a:endParaRPr lang="en-US"/>
           </a:p>
@@ -6010,7 +6010,7 @@
           <a:p>
             <a:fld id="{883C4EB8-5BFD-4159-A72D-C2776364B018}" type="datetime1">
               <a:rPr lang="en-US" smtClean="0"/>
-              <a:t>1/18/2018</a:t>
+              <a:t>1/19/2018</a:t>
             </a:fld>
             <a:endParaRPr lang="en-US"/>
           </a:p>
@@ -6452,7 +6452,7 @@
           <a:p>
             <a:fld id="{5A7D63EA-6161-451A-A0F2-180457136142}" type="datetime1">
               <a:rPr lang="en-US" smtClean="0"/>
-              <a:t>1/18/2018</a:t>
+              <a:t>1/19/2018</a:t>
             </a:fld>
             <a:endParaRPr lang="en-US"/>
           </a:p>
@@ -6587,7 +6587,7 @@
           <a:p>
             <a:fld id="{BABC1D1C-8B0E-4131-A976-A04913DCA754}" type="datetime1">
               <a:rPr lang="en-US" smtClean="0"/>
-              <a:t>1/18/2018</a:t>
+              <a:t>1/19/2018</a:t>
             </a:fld>
             <a:endParaRPr lang="en-US"/>
           </a:p>
@@ -6700,7 +6700,7 @@
           <a:p>
             <a:fld id="{EF1416D0-C41F-4D88-B020-7F74E89E4490}" type="datetime1">
               <a:rPr lang="en-US" smtClean="0"/>
-              <a:t>1/18/2018</a:t>
+              <a:t>1/19/2018</a:t>
             </a:fld>
             <a:endParaRPr lang="en-US"/>
           </a:p>
@@ -6993,7 +6993,7 @@
           <a:p>
             <a:fld id="{B8924456-345A-46DF-8D2A-935514574781}" type="datetime1">
               <a:rPr lang="en-US" smtClean="0"/>
-              <a:t>1/18/2018</a:t>
+              <a:t>1/19/2018</a:t>
             </a:fld>
             <a:endParaRPr lang="en-US"/>
           </a:p>
@@ -7267,7 +7267,7 @@
           <a:p>
             <a:fld id="{5639636D-8884-4082-A066-DA2A6F62C12B}" type="datetime1">
               <a:rPr lang="en-US" smtClean="0"/>
-              <a:t>1/18/2018</a:t>
+              <a:t>1/19/2018</a:t>
             </a:fld>
             <a:endParaRPr lang="en-US"/>
           </a:p>
@@ -7389,17 +7389,17 @@
           </a:ln>
           <a:extLst>
             <a:ext uri="{FAA26D3D-D897-4be2-8F04-BA451C77F1D7}">
-              <ma14:placeholderFlag xmlns:ma14="http://schemas.microsoft.com/office/mac/drawingml/2011/main" xmlns="" val="1"/>
+              <ma14:placeholderFlag xmlns="" xmlns:ma14="http://schemas.microsoft.com/office/mac/drawingml/2011/main" val="1"/>
             </a:ext>
             <a:ext uri="{909E8E84-426E-40dd-AFC4-6F175D3DCCD1}">
-              <a14:hiddenFill xmlns:a14="http://schemas.microsoft.com/office/drawing/2010/main" xmlns="">
+              <a14:hiddenFill xmlns="" xmlns:a14="http://schemas.microsoft.com/office/drawing/2010/main">
                 <a:solidFill>
                   <a:srgbClr val="FFFFFF"/>
                 </a:solidFill>
               </a14:hiddenFill>
             </a:ext>
             <a:ext uri="{91240B29-F687-4f45-9708-019B960494DF}">
-              <a14:hiddenLine xmlns:a14="http://schemas.microsoft.com/office/drawing/2010/main" xmlns="" w="9525">
+              <a14:hiddenLine xmlns="" xmlns:a14="http://schemas.microsoft.com/office/drawing/2010/main" w="9525">
                 <a:solidFill>
                   <a:srgbClr val="000000"/>
                 </a:solidFill>
@@ -7451,17 +7451,17 @@
           </a:ln>
           <a:extLst>
             <a:ext uri="{FAA26D3D-D897-4be2-8F04-BA451C77F1D7}">
-              <ma14:placeholderFlag xmlns:ma14="http://schemas.microsoft.com/office/mac/drawingml/2011/main" xmlns="" val="1"/>
+              <ma14:placeholderFlag xmlns="" xmlns:ma14="http://schemas.microsoft.com/office/mac/drawingml/2011/main" val="1"/>
             </a:ext>
             <a:ext uri="{909E8E84-426E-40dd-AFC4-6F175D3DCCD1}">
-              <a14:hiddenFill xmlns:a14="http://schemas.microsoft.com/office/drawing/2010/main" xmlns="">
+              <a14:hiddenFill xmlns="" xmlns:a14="http://schemas.microsoft.com/office/drawing/2010/main">
                 <a:solidFill>
                   <a:srgbClr val="FFFFFF"/>
                 </a:solidFill>
               </a14:hiddenFill>
             </a:ext>
             <a:ext uri="{91240B29-F687-4f45-9708-019B960494DF}">
-              <a14:hiddenLine xmlns:a14="http://schemas.microsoft.com/office/drawing/2010/main" xmlns="" w="9525">
+              <a14:hiddenLine xmlns="" xmlns:a14="http://schemas.microsoft.com/office/drawing/2010/main" w="9525">
                 <a:solidFill>
                   <a:srgbClr val="000000"/>
                 </a:solidFill>
@@ -7561,7 +7561,7 @@
           <a:p>
             <a:fld id="{25085B04-7A33-416C-A7FB-D64ADDEB8FCC}" type="datetime1">
               <a:rPr lang="en-US" smtClean="0"/>
-              <a:t>1/18/2018</a:t>
+              <a:t>1/19/2018</a:t>
             </a:fld>
             <a:endParaRPr lang="en-US"/>
           </a:p>
@@ -7729,7 +7729,7 @@
           </a:ln>
           <a:extLst>
             <a:ext uri="{909E8E84-426E-40dd-AFC4-6F175D3DCCD1}">
-              <a14:hiddenFill xmlns:a14="http://schemas.microsoft.com/office/drawing/2010/main" xmlns="">
+              <a14:hiddenFill xmlns="" xmlns:a14="http://schemas.microsoft.com/office/drawing/2010/main">
                 <a:solidFill>
                   <a:srgbClr val="FFFFFF"/>
                 </a:solidFill>
@@ -7772,7 +7772,7 @@
           </a:ln>
           <a:extLst>
             <a:ext uri="{909E8E84-426E-40dd-AFC4-6F175D3DCCD1}">
-              <a14:hiddenFill xmlns:a14="http://schemas.microsoft.com/office/drawing/2010/main" xmlns="">
+              <a14:hiddenFill xmlns="" xmlns:a14="http://schemas.microsoft.com/office/drawing/2010/main">
                 <a:noFill/>
               </a14:hiddenFill>
             </a:ext>
@@ -8408,7 +8408,7 @@
           <a:p>
             <a:fld id="{A7853F80-D63E-429F-B326-B00475E1D8E8}" type="datetime1">
               <a:rPr lang="en-US" smtClean="0"/>
-              <a:t>1/18/2018</a:t>
+              <a:t>1/19/2018</a:t>
             </a:fld>
             <a:endParaRPr lang="en-US"/>
           </a:p>
@@ -8884,17 +8884,17 @@
           </a:ln>
           <a:extLst>
             <a:ext uri="{FAA26D3D-D897-4be2-8F04-BA451C77F1D7}">
-              <ma14:placeholderFlag xmlns:ma14="http://schemas.microsoft.com/office/mac/drawingml/2011/main" xmlns="" val="1"/>
+              <ma14:placeholderFlag xmlns="" xmlns:ma14="http://schemas.microsoft.com/office/mac/drawingml/2011/main" val="1"/>
             </a:ext>
             <a:ext uri="{909E8E84-426E-40dd-AFC4-6F175D3DCCD1}">
-              <a14:hiddenFill xmlns:a14="http://schemas.microsoft.com/office/drawing/2010/main" xmlns="">
+              <a14:hiddenFill xmlns="" xmlns:a14="http://schemas.microsoft.com/office/drawing/2010/main">
                 <a:solidFill>
                   <a:srgbClr val="FFFFFF"/>
                 </a:solidFill>
               </a14:hiddenFill>
             </a:ext>
             <a:ext uri="{91240B29-F687-4f45-9708-019B960494DF}">
-              <a14:hiddenLine xmlns:a14="http://schemas.microsoft.com/office/drawing/2010/main" xmlns="" w="9525">
+              <a14:hiddenLine xmlns="" xmlns:a14="http://schemas.microsoft.com/office/drawing/2010/main" w="9525">
                 <a:solidFill>
                   <a:srgbClr val="000000"/>
                 </a:solidFill>
@@ -10355,13 +10355,7 @@
           <a:p>
             <a:r>
               <a:rPr lang="en-US" dirty="0"/>
-              <a:t>So can we do assessments in TMB?</a:t>
-            </a:r>
-          </a:p>
-          <a:p>
-            <a:r>
-              <a:rPr lang="en-US" dirty="0"/>
-              <a:t>Of course! </a:t>
+              <a:t>So can we do assessments in TMB? Yes! </a:t>
             </a:r>
           </a:p>
           <a:p>
@@ -11199,7 +11193,7 @@
             </a:r>
             <a:r>
               <a:rPr lang="en-US" dirty="0"/>
-              <a:t>=.5) instead of estimated</a:t>
+              <a:t>=.1) instead of estimated</a:t>
             </a:r>
           </a:p>
           <a:p>
@@ -11335,8 +11329,8 @@
         </p:nvSpPr>
         <p:spPr>
           <a:xfrm>
-            <a:off x="628650" y="1417638"/>
-            <a:ext cx="7886700" cy="4667249"/>
+            <a:off x="628650" y="1201272"/>
+            <a:ext cx="7886700" cy="4883616"/>
           </a:xfrm>
         </p:spPr>
         <p:txBody>
@@ -11970,8 +11964,8 @@
           </a:p>
         </p:txBody>
       </p:sp>
-      <mc:AlternateContent xmlns:mc="http://schemas.openxmlformats.org/markup-compatibility/2006">
-        <mc:Choice xmlns:a14="http://schemas.microsoft.com/office/drawing/2010/main" Requires="a14">
+      <mc:AlternateContent xmlns:mc="http://schemas.openxmlformats.org/markup-compatibility/2006" xmlns:a14="http://schemas.microsoft.com/office/drawing/2010/main">
+        <mc:Choice Requires="a14">
           <p:sp>
             <p:nvSpPr>
               <p:cNvPr id="3" name="Content Placeholder 2">
@@ -12195,7 +12189,7 @@
             </p:txBody>
           </p:sp>
         </mc:Choice>
-        <mc:Fallback>
+        <mc:Fallback xmlns="">
           <p:sp>
             <p:nvSpPr>
               <p:cNvPr id="3" name="Content Placeholder 2">

</xml_diff>